<commit_message>
Last version of the global image for the intro (in .pptx)
</commit_message>
<xml_diff>
--- a/images/intro/GemocWorkbenchesGlobalPicture.pptx
+++ b/images/intro/GemocWorkbenchesGlobalPicture.pptx
@@ -288,7 +288,7 @@
           <a:p>
             <a:fld id="{3CB80180-027D-416E-ABC6-0AB7712C8529}" type="datetimeFigureOut">
               <a:rPr lang="fr-FR" smtClean="0"/>
-              <a:t>08/04/2015</a:t>
+              <a:t>03/06/15</a:t>
             </a:fld>
             <a:endParaRPr lang="fr-FR"/>
           </a:p>
@@ -330,7 +330,7 @@
           <a:p>
             <a:fld id="{4DB7CC70-FF22-4833-BD59-CCF23EF9E81E}" type="slidenum">
               <a:rPr lang="fr-FR" smtClean="0"/>
-              <a:t>‹N°›</a:t>
+              <a:t>‹#›</a:t>
             </a:fld>
             <a:endParaRPr lang="fr-FR"/>
           </a:p>
@@ -458,7 +458,7 @@
           <a:p>
             <a:fld id="{3CB80180-027D-416E-ABC6-0AB7712C8529}" type="datetimeFigureOut">
               <a:rPr lang="fr-FR" smtClean="0"/>
-              <a:t>08/04/2015</a:t>
+              <a:t>03/06/15</a:t>
             </a:fld>
             <a:endParaRPr lang="fr-FR"/>
           </a:p>
@@ -500,7 +500,7 @@
           <a:p>
             <a:fld id="{4DB7CC70-FF22-4833-BD59-CCF23EF9E81E}" type="slidenum">
               <a:rPr lang="fr-FR" smtClean="0"/>
-              <a:t>‹N°›</a:t>
+              <a:t>‹#›</a:t>
             </a:fld>
             <a:endParaRPr lang="fr-FR"/>
           </a:p>
@@ -638,7 +638,7 @@
           <a:p>
             <a:fld id="{3CB80180-027D-416E-ABC6-0AB7712C8529}" type="datetimeFigureOut">
               <a:rPr lang="fr-FR" smtClean="0"/>
-              <a:t>08/04/2015</a:t>
+              <a:t>03/06/15</a:t>
             </a:fld>
             <a:endParaRPr lang="fr-FR"/>
           </a:p>
@@ -680,7 +680,7 @@
           <a:p>
             <a:fld id="{4DB7CC70-FF22-4833-BD59-CCF23EF9E81E}" type="slidenum">
               <a:rPr lang="fr-FR" smtClean="0"/>
-              <a:t>‹N°›</a:t>
+              <a:t>‹#›</a:t>
             </a:fld>
             <a:endParaRPr lang="fr-FR"/>
           </a:p>
@@ -808,7 +808,7 @@
           <a:p>
             <a:fld id="{3CB80180-027D-416E-ABC6-0AB7712C8529}" type="datetimeFigureOut">
               <a:rPr lang="fr-FR" smtClean="0"/>
-              <a:t>08/04/2015</a:t>
+              <a:t>03/06/15</a:t>
             </a:fld>
             <a:endParaRPr lang="fr-FR"/>
           </a:p>
@@ -850,7 +850,7 @@
           <a:p>
             <a:fld id="{4DB7CC70-FF22-4833-BD59-CCF23EF9E81E}" type="slidenum">
               <a:rPr lang="fr-FR" smtClean="0"/>
-              <a:t>‹N°›</a:t>
+              <a:t>‹#›</a:t>
             </a:fld>
             <a:endParaRPr lang="fr-FR"/>
           </a:p>
@@ -1054,7 +1054,7 @@
           <a:p>
             <a:fld id="{3CB80180-027D-416E-ABC6-0AB7712C8529}" type="datetimeFigureOut">
               <a:rPr lang="fr-FR" smtClean="0"/>
-              <a:t>08/04/2015</a:t>
+              <a:t>03/06/15</a:t>
             </a:fld>
             <a:endParaRPr lang="fr-FR"/>
           </a:p>
@@ -1096,7 +1096,7 @@
           <a:p>
             <a:fld id="{4DB7CC70-FF22-4833-BD59-CCF23EF9E81E}" type="slidenum">
               <a:rPr lang="fr-FR" smtClean="0"/>
-              <a:t>‹N°›</a:t>
+              <a:t>‹#›</a:t>
             </a:fld>
             <a:endParaRPr lang="fr-FR"/>
           </a:p>
@@ -1342,7 +1342,7 @@
           <a:p>
             <a:fld id="{3CB80180-027D-416E-ABC6-0AB7712C8529}" type="datetimeFigureOut">
               <a:rPr lang="fr-FR" smtClean="0"/>
-              <a:t>08/04/2015</a:t>
+              <a:t>03/06/15</a:t>
             </a:fld>
             <a:endParaRPr lang="fr-FR"/>
           </a:p>
@@ -1384,7 +1384,7 @@
           <a:p>
             <a:fld id="{4DB7CC70-FF22-4833-BD59-CCF23EF9E81E}" type="slidenum">
               <a:rPr lang="fr-FR" smtClean="0"/>
-              <a:t>‹N°›</a:t>
+              <a:t>‹#›</a:t>
             </a:fld>
             <a:endParaRPr lang="fr-FR"/>
           </a:p>
@@ -1764,7 +1764,7 @@
           <a:p>
             <a:fld id="{3CB80180-027D-416E-ABC6-0AB7712C8529}" type="datetimeFigureOut">
               <a:rPr lang="fr-FR" smtClean="0"/>
-              <a:t>08/04/2015</a:t>
+              <a:t>03/06/15</a:t>
             </a:fld>
             <a:endParaRPr lang="fr-FR"/>
           </a:p>
@@ -1806,7 +1806,7 @@
           <a:p>
             <a:fld id="{4DB7CC70-FF22-4833-BD59-CCF23EF9E81E}" type="slidenum">
               <a:rPr lang="fr-FR" smtClean="0"/>
-              <a:t>‹N°›</a:t>
+              <a:t>‹#›</a:t>
             </a:fld>
             <a:endParaRPr lang="fr-FR"/>
           </a:p>
@@ -1882,7 +1882,7 @@
           <a:p>
             <a:fld id="{3CB80180-027D-416E-ABC6-0AB7712C8529}" type="datetimeFigureOut">
               <a:rPr lang="fr-FR" smtClean="0"/>
-              <a:t>08/04/2015</a:t>
+              <a:t>03/06/15</a:t>
             </a:fld>
             <a:endParaRPr lang="fr-FR"/>
           </a:p>
@@ -1924,7 +1924,7 @@
           <a:p>
             <a:fld id="{4DB7CC70-FF22-4833-BD59-CCF23EF9E81E}" type="slidenum">
               <a:rPr lang="fr-FR" smtClean="0"/>
-              <a:t>‹N°›</a:t>
+              <a:t>‹#›</a:t>
             </a:fld>
             <a:endParaRPr lang="fr-FR"/>
           </a:p>
@@ -1977,7 +1977,7 @@
           <a:p>
             <a:fld id="{3CB80180-027D-416E-ABC6-0AB7712C8529}" type="datetimeFigureOut">
               <a:rPr lang="fr-FR" smtClean="0"/>
-              <a:t>08/04/2015</a:t>
+              <a:t>03/06/15</a:t>
             </a:fld>
             <a:endParaRPr lang="fr-FR"/>
           </a:p>
@@ -2019,7 +2019,7 @@
           <a:p>
             <a:fld id="{4DB7CC70-FF22-4833-BD59-CCF23EF9E81E}" type="slidenum">
               <a:rPr lang="fr-FR" smtClean="0"/>
-              <a:t>‹N°›</a:t>
+              <a:t>‹#›</a:t>
             </a:fld>
             <a:endParaRPr lang="fr-FR"/>
           </a:p>
@@ -2254,7 +2254,7 @@
           <a:p>
             <a:fld id="{3CB80180-027D-416E-ABC6-0AB7712C8529}" type="datetimeFigureOut">
               <a:rPr lang="fr-FR" smtClean="0"/>
-              <a:t>08/04/2015</a:t>
+              <a:t>03/06/15</a:t>
             </a:fld>
             <a:endParaRPr lang="fr-FR"/>
           </a:p>
@@ -2296,7 +2296,7 @@
           <a:p>
             <a:fld id="{4DB7CC70-FF22-4833-BD59-CCF23EF9E81E}" type="slidenum">
               <a:rPr lang="fr-FR" smtClean="0"/>
-              <a:t>‹N°›</a:t>
+              <a:t>‹#›</a:t>
             </a:fld>
             <a:endParaRPr lang="fr-FR"/>
           </a:p>
@@ -2507,7 +2507,7 @@
           <a:p>
             <a:fld id="{3CB80180-027D-416E-ABC6-0AB7712C8529}" type="datetimeFigureOut">
               <a:rPr lang="fr-FR" smtClean="0"/>
-              <a:t>08/04/2015</a:t>
+              <a:t>03/06/15</a:t>
             </a:fld>
             <a:endParaRPr lang="fr-FR"/>
           </a:p>
@@ -2549,7 +2549,7 @@
           <a:p>
             <a:fld id="{4DB7CC70-FF22-4833-BD59-CCF23EF9E81E}" type="slidenum">
               <a:rPr lang="fr-FR" smtClean="0"/>
-              <a:t>‹N°›</a:t>
+              <a:t>‹#›</a:t>
             </a:fld>
             <a:endParaRPr lang="fr-FR"/>
           </a:p>
@@ -2720,7 +2720,7 @@
           <a:p>
             <a:fld id="{3CB80180-027D-416E-ABC6-0AB7712C8529}" type="datetimeFigureOut">
               <a:rPr lang="fr-FR" smtClean="0"/>
-              <a:t>08/04/2015</a:t>
+              <a:t>03/06/15</a:t>
             </a:fld>
             <a:endParaRPr lang="fr-FR"/>
           </a:p>
@@ -2798,7 +2798,7 @@
           <a:p>
             <a:fld id="{4DB7CC70-FF22-4833-BD59-CCF23EF9E81E}" type="slidenum">
               <a:rPr lang="fr-FR" smtClean="0"/>
-              <a:t>‹N°›</a:t>
+              <a:t>‹#›</a:t>
             </a:fld>
             <a:endParaRPr lang="fr-FR"/>
           </a:p>
@@ -3095,130 +3095,6 @@
           <a:chExt cx="0" cy="0"/>
         </a:xfrm>
       </p:grpSpPr>
-      <p:sp>
-        <p:nvSpPr>
-          <p:cNvPr id="7" name="Rectangle 6"/>
-          <p:cNvSpPr/>
-          <p:nvPr/>
-        </p:nvSpPr>
-        <p:spPr>
-          <a:xfrm>
-            <a:off x="2987824" y="4615485"/>
-            <a:ext cx="2736304" cy="1512168"/>
-          </a:xfrm>
-          <a:prstGeom prst="rect">
-            <a:avLst/>
-          </a:prstGeom>
-        </p:spPr>
-        <p:style>
-          <a:lnRef idx="2">
-            <a:schemeClr val="accent1">
-              <a:shade val="50000"/>
-            </a:schemeClr>
-          </a:lnRef>
-          <a:fillRef idx="1">
-            <a:schemeClr val="accent1"/>
-          </a:fillRef>
-          <a:effectRef idx="0">
-            <a:schemeClr val="accent1"/>
-          </a:effectRef>
-          <a:fontRef idx="minor">
-            <a:schemeClr val="lt1"/>
-          </a:fontRef>
-        </p:style>
-        <p:txBody>
-          <a:bodyPr rtlCol="0" anchor="ctr"/>
-          <a:lstStyle/>
-          <a:p>
-            <a:pPr algn="ctr"/>
-            <a:endParaRPr lang="fr-FR" dirty="0" smtClean="0"/>
-          </a:p>
-          <a:p>
-            <a:pPr algn="ctr"/>
-            <a:endParaRPr lang="fr-FR" dirty="0"/>
-          </a:p>
-          <a:p>
-            <a:pPr algn="ctr"/>
-            <a:endParaRPr lang="fr-FR" dirty="0" smtClean="0"/>
-          </a:p>
-          <a:p>
-            <a:pPr algn="ctr"/>
-            <a:r>
-              <a:rPr lang="fr-FR" dirty="0" err="1" smtClean="0"/>
-              <a:t>Modeling</a:t>
-            </a:r>
-            <a:r>
-              <a:rPr lang="fr-FR" dirty="0" smtClean="0"/>
-              <a:t> </a:t>
-            </a:r>
-            <a:r>
-              <a:rPr lang="fr-FR" dirty="0" err="1" smtClean="0"/>
-              <a:t>Workbench</a:t>
-            </a:r>
-            <a:endParaRPr lang="fr-FR" dirty="0"/>
-          </a:p>
-        </p:txBody>
-      </p:sp>
-      <p:sp>
-        <p:nvSpPr>
-          <p:cNvPr id="4" name="Rectangle 3"/>
-          <p:cNvSpPr/>
-          <p:nvPr/>
-        </p:nvSpPr>
-        <p:spPr>
-          <a:xfrm>
-            <a:off x="2987824" y="901857"/>
-            <a:ext cx="2736304" cy="1512168"/>
-          </a:xfrm>
-          <a:prstGeom prst="rect">
-            <a:avLst/>
-          </a:prstGeom>
-        </p:spPr>
-        <p:style>
-          <a:lnRef idx="2">
-            <a:schemeClr val="accent1">
-              <a:shade val="50000"/>
-            </a:schemeClr>
-          </a:lnRef>
-          <a:fillRef idx="1">
-            <a:schemeClr val="accent1"/>
-          </a:fillRef>
-          <a:effectRef idx="0">
-            <a:schemeClr val="accent1"/>
-          </a:effectRef>
-          <a:fontRef idx="minor">
-            <a:schemeClr val="lt1"/>
-          </a:fontRef>
-        </p:style>
-        <p:txBody>
-          <a:bodyPr rtlCol="0" anchor="ctr"/>
-          <a:lstStyle/>
-          <a:p>
-            <a:pPr algn="ctr"/>
-            <a:endParaRPr lang="fr-FR" dirty="0" smtClean="0"/>
-          </a:p>
-          <a:p>
-            <a:pPr algn="ctr"/>
-            <a:endParaRPr lang="fr-FR" dirty="0"/>
-          </a:p>
-          <a:p>
-            <a:pPr algn="ctr"/>
-            <a:r>
-              <a:rPr lang="fr-FR" dirty="0" err="1" smtClean="0"/>
-              <a:t>Language</a:t>
-            </a:r>
-            <a:r>
-              <a:rPr lang="fr-FR" dirty="0" smtClean="0"/>
-              <a:t> </a:t>
-            </a:r>
-            <a:r>
-              <a:rPr lang="fr-FR" dirty="0" err="1" smtClean="0"/>
-              <a:t>Workbench</a:t>
-            </a:r>
-            <a:endParaRPr lang="fr-FR" dirty="0"/>
-          </a:p>
-        </p:txBody>
-      </p:sp>
       <p:cxnSp>
         <p:nvCxnSpPr>
           <p:cNvPr id="6" name="Connecteur droit 5"/>
@@ -3227,8 +3103,8 @@
         </p:nvCxnSpPr>
         <p:spPr>
           <a:xfrm>
-            <a:off x="1043608" y="3632448"/>
-            <a:ext cx="6624736" cy="0"/>
+            <a:off x="1555314" y="3540031"/>
+            <a:ext cx="6408712" cy="0"/>
           </a:xfrm>
           <a:prstGeom prst="line">
             <a:avLst/>
@@ -3260,7 +3136,7 @@
         </p:nvSpPr>
         <p:spPr>
           <a:xfrm flipH="1">
-            <a:off x="107504" y="905305"/>
+            <a:off x="1339290" y="1304368"/>
             <a:ext cx="1872208" cy="435463"/>
           </a:xfrm>
           <a:prstGeom prst="accentCallout2">
@@ -3269,8 +3145,8 @@
               <a:gd name="adj2" fmla="val -8333"/>
               <a:gd name="adj3" fmla="val 18750"/>
               <a:gd name="adj4" fmla="val -16667"/>
-              <a:gd name="adj5" fmla="val 54478"/>
-              <a:gd name="adj6" fmla="val -44739"/>
+              <a:gd name="adj5" fmla="val 74039"/>
+              <a:gd name="adj6" fmla="val -50530"/>
             </a:avLst>
           </a:prstGeom>
         </p:spPr>
@@ -3294,18 +3170,46 @@
           <a:p>
             <a:pPr algn="ctr"/>
             <a:r>
-              <a:rPr lang="fr-FR" dirty="0" err="1" smtClean="0"/>
+              <a:rPr lang="fr-FR" u="sng" dirty="0" err="1" smtClean="0">
+                <a:solidFill>
+                  <a:schemeClr val="tx2">
+                    <a:lumMod val="60000"/>
+                    <a:lumOff val="40000"/>
+                  </a:schemeClr>
+                </a:solidFill>
+              </a:rPr>
               <a:t>Create</a:t>
             </a:r>
             <a:r>
-              <a:rPr lang="fr-FR" dirty="0" smtClean="0"/>
-              <a:t> </a:t>
-            </a:r>
-            <a:r>
-              <a:rPr lang="fr-FR" dirty="0" err="1" smtClean="0"/>
-              <a:t>Language</a:t>
-            </a:r>
-            <a:endParaRPr lang="fr-FR" dirty="0"/>
+              <a:rPr lang="fr-FR" u="sng" dirty="0" smtClean="0">
+                <a:solidFill>
+                  <a:schemeClr val="tx2">
+                    <a:lumMod val="60000"/>
+                    <a:lumOff val="40000"/>
+                  </a:schemeClr>
+                </a:solidFill>
+              </a:rPr>
+              <a:t> a </a:t>
+            </a:r>
+            <a:r>
+              <a:rPr lang="fr-FR" u="sng" dirty="0" err="1" smtClean="0">
+                <a:solidFill>
+                  <a:schemeClr val="tx2">
+                    <a:lumMod val="60000"/>
+                    <a:lumOff val="40000"/>
+                  </a:schemeClr>
+                </a:solidFill>
+              </a:rPr>
+              <a:t>language</a:t>
+            </a:r>
+            <a:endParaRPr lang="fr-FR" u="sng" dirty="0">
+              <a:solidFill>
+                <a:schemeClr val="tx2">
+                  <a:lumMod val="60000"/>
+                  <a:lumOff val="40000"/>
+                </a:schemeClr>
+              </a:solidFill>
+            </a:endParaRPr>
           </a:p>
         </p:txBody>
       </p:sp>
@@ -3317,7 +3221,7 @@
         </p:nvSpPr>
         <p:spPr>
           <a:xfrm flipH="1">
-            <a:off x="112844" y="2414024"/>
+            <a:off x="1344630" y="2813087"/>
             <a:ext cx="1872208" cy="435463"/>
           </a:xfrm>
           <a:prstGeom prst="accentCallout2">
@@ -3326,8 +3230,8 @@
               <a:gd name="adj2" fmla="val -8333"/>
               <a:gd name="adj3" fmla="val 18750"/>
               <a:gd name="adj4" fmla="val -16667"/>
-              <a:gd name="adj5" fmla="val -49244"/>
-              <a:gd name="adj6" fmla="val -45260"/>
+              <a:gd name="adj5" fmla="val -116818"/>
+              <a:gd name="adj6" fmla="val -51051"/>
             </a:avLst>
           </a:prstGeom>
         </p:spPr>
@@ -3351,22 +3255,57 @@
           <a:p>
             <a:pPr algn="ctr"/>
             <a:r>
-              <a:rPr lang="fr-FR" dirty="0" err="1" smtClean="0"/>
+              <a:rPr lang="fr-FR" u="sng" dirty="0" err="1">
+                <a:solidFill>
+                  <a:schemeClr val="tx2">
+                    <a:lumMod val="60000"/>
+                    <a:lumOff val="40000"/>
+                  </a:schemeClr>
+                </a:solidFill>
+              </a:rPr>
               <a:t>Define</a:t>
             </a:r>
             <a:r>
-              <a:rPr lang="fr-FR" dirty="0" smtClean="0"/>
+              <a:rPr lang="fr-FR" u="sng" dirty="0">
+                <a:solidFill>
+                  <a:schemeClr val="tx2">
+                    <a:lumMod val="60000"/>
+                    <a:lumOff val="40000"/>
+                  </a:schemeClr>
+                </a:solidFill>
+              </a:rPr>
               <a:t> </a:t>
             </a:r>
             <a:r>
-              <a:rPr lang="fr-FR" dirty="0" err="1" smtClean="0"/>
-              <a:t>runtime</a:t>
-            </a:r>
-            <a:r>
-              <a:rPr lang="fr-FR" dirty="0" smtClean="0"/>
-              <a:t> environnement</a:t>
-            </a:r>
-            <a:endParaRPr lang="fr-FR" dirty="0"/>
+              <a:rPr lang="fr-FR" u="sng" dirty="0" smtClean="0">
+                <a:solidFill>
+                  <a:schemeClr val="tx2">
+                    <a:lumMod val="60000"/>
+                    <a:lumOff val="40000"/>
+                  </a:schemeClr>
+                </a:solidFill>
+              </a:rPr>
+              <a:t>an </a:t>
+            </a:r>
+            <a:r>
+              <a:rPr lang="fr-FR" u="sng" dirty="0" err="1" smtClean="0">
+                <a:solidFill>
+                  <a:schemeClr val="tx2">
+                    <a:lumMod val="60000"/>
+                    <a:lumOff val="40000"/>
+                  </a:schemeClr>
+                </a:solidFill>
+              </a:rPr>
+              <a:t>animator</a:t>
+            </a:r>
+            <a:endParaRPr lang="fr-FR" u="sng" dirty="0">
+              <a:solidFill>
+                <a:schemeClr val="tx2">
+                  <a:lumMod val="60000"/>
+                  <a:lumOff val="40000"/>
+                </a:schemeClr>
+              </a:solidFill>
+            </a:endParaRPr>
           </a:p>
         </p:txBody>
       </p:sp>
@@ -3378,7 +3317,7 @@
         </p:nvSpPr>
         <p:spPr>
           <a:xfrm flipH="1">
-            <a:off x="107504" y="1625385"/>
+            <a:off x="1339290" y="2024448"/>
             <a:ext cx="1872208" cy="435463"/>
           </a:xfrm>
           <a:prstGeom prst="accentCallout2">
@@ -3387,8 +3326,8 @@
               <a:gd name="adj2" fmla="val -8333"/>
               <a:gd name="adj3" fmla="val 18750"/>
               <a:gd name="adj4" fmla="val -16667"/>
-              <a:gd name="adj5" fmla="val -13905"/>
-              <a:gd name="adj6" fmla="val -46151"/>
+              <a:gd name="adj5" fmla="val -5014"/>
+              <a:gd name="adj6" fmla="val -49874"/>
             </a:avLst>
           </a:prstGeom>
         </p:spPr>
@@ -3412,26 +3351,68 @@
           <a:p>
             <a:pPr algn="ctr"/>
             <a:r>
-              <a:rPr lang="fr-FR" dirty="0" err="1" smtClean="0"/>
+              <a:rPr lang="fr-FR" u="sng" dirty="0" err="1" smtClean="0">
+                <a:solidFill>
+                  <a:schemeClr val="tx2">
+                    <a:lumMod val="60000"/>
+                    <a:lumOff val="40000"/>
+                  </a:schemeClr>
+                </a:solidFill>
+              </a:rPr>
               <a:t>Make</a:t>
             </a:r>
             <a:r>
-              <a:rPr lang="fr-FR" dirty="0" smtClean="0"/>
+              <a:rPr lang="fr-FR" u="sng" dirty="0" smtClean="0">
+                <a:solidFill>
+                  <a:schemeClr val="tx2">
+                    <a:lumMod val="60000"/>
+                    <a:lumOff val="40000"/>
+                  </a:schemeClr>
+                </a:solidFill>
+              </a:rPr>
+              <a:t> a </a:t>
+            </a:r>
+            <a:r>
+              <a:rPr lang="fr-FR" u="sng" dirty="0" err="1">
+                <a:solidFill>
+                  <a:schemeClr val="tx2">
+                    <a:lumMod val="60000"/>
+                    <a:lumOff val="40000"/>
+                  </a:schemeClr>
+                </a:solidFill>
+              </a:rPr>
+              <a:t>language</a:t>
+            </a:r>
+            <a:r>
+              <a:rPr lang="fr-FR" u="sng" dirty="0">
+                <a:solidFill>
+                  <a:schemeClr val="tx2">
+                    <a:lumMod val="60000"/>
+                    <a:lumOff val="40000"/>
+                  </a:schemeClr>
+                </a:solidFill>
+              </a:rPr>
               <a:t> </a:t>
             </a:r>
             <a:r>
-              <a:rPr lang="fr-FR" dirty="0" err="1" smtClean="0"/>
-              <a:t>language</a:t>
-            </a:r>
-            <a:r>
-              <a:rPr lang="fr-FR" dirty="0" smtClean="0"/>
-              <a:t> </a:t>
-            </a:r>
-            <a:r>
-              <a:rPr lang="fr-FR" dirty="0" err="1" smtClean="0"/>
+              <a:rPr lang="fr-FR" u="sng" dirty="0" err="1">
+                <a:solidFill>
+                  <a:schemeClr val="tx2">
+                    <a:lumMod val="60000"/>
+                    <a:lumOff val="40000"/>
+                  </a:schemeClr>
+                </a:solidFill>
+              </a:rPr>
               <a:t>executable</a:t>
             </a:r>
-            <a:endParaRPr lang="fr-FR" dirty="0"/>
+            <a:endParaRPr lang="fr-FR" u="sng" dirty="0">
+              <a:solidFill>
+                <a:schemeClr val="tx2">
+                  <a:lumMod val="60000"/>
+                  <a:lumOff val="40000"/>
+                </a:schemeClr>
+              </a:solidFill>
+            </a:endParaRPr>
           </a:p>
         </p:txBody>
       </p:sp>
@@ -3443,7 +3424,7 @@
         </p:nvSpPr>
         <p:spPr>
           <a:xfrm>
-            <a:off x="843010" y="77138"/>
+            <a:off x="2203386" y="587703"/>
             <a:ext cx="1938031" cy="369332"/>
           </a:xfrm>
           <a:prstGeom prst="rect">
@@ -3476,7 +3457,7 @@
         </p:nvSpPr>
         <p:spPr>
           <a:xfrm>
-            <a:off x="6636459" y="215316"/>
+            <a:off x="5697044" y="587703"/>
             <a:ext cx="2063770" cy="369332"/>
           </a:xfrm>
           <a:prstGeom prst="rect">
@@ -3514,7 +3495,7 @@
         </p:nvSpPr>
         <p:spPr>
           <a:xfrm>
-            <a:off x="1128024" y="3923763"/>
+            <a:off x="2359810" y="3852795"/>
             <a:ext cx="1653017" cy="369332"/>
           </a:xfrm>
           <a:prstGeom prst="rect">
@@ -3544,7 +3525,7 @@
         </p:nvSpPr>
         <p:spPr>
           <a:xfrm flipH="1">
-            <a:off x="107504" y="4713616"/>
+            <a:off x="1477966" y="4510160"/>
             <a:ext cx="1872208" cy="435463"/>
           </a:xfrm>
           <a:prstGeom prst="accentCallout2">
@@ -3578,18 +3559,46 @@
           <a:p>
             <a:pPr algn="ctr"/>
             <a:r>
-              <a:rPr lang="fr-FR" dirty="0" err="1" smtClean="0"/>
+              <a:rPr lang="fr-FR" u="sng" dirty="0" err="1">
+                <a:solidFill>
+                  <a:schemeClr val="tx2">
+                    <a:lumMod val="60000"/>
+                    <a:lumOff val="40000"/>
+                  </a:schemeClr>
+                </a:solidFill>
+              </a:rPr>
               <a:t>Create</a:t>
             </a:r>
             <a:r>
-              <a:rPr lang="fr-FR" dirty="0" smtClean="0"/>
+              <a:rPr lang="fr-FR" u="sng" dirty="0">
+                <a:solidFill>
+                  <a:schemeClr val="tx2">
+                    <a:lumMod val="60000"/>
+                    <a:lumOff val="40000"/>
+                  </a:schemeClr>
+                </a:solidFill>
+              </a:rPr>
               <a:t> </a:t>
             </a:r>
             <a:r>
-              <a:rPr lang="fr-FR" dirty="0" err="1" smtClean="0"/>
-              <a:t>Models</a:t>
-            </a:r>
-            <a:endParaRPr lang="fr-FR" dirty="0"/>
+              <a:rPr lang="fr-FR" u="sng" dirty="0" err="1" smtClean="0">
+                <a:solidFill>
+                  <a:schemeClr val="tx2">
+                    <a:lumMod val="60000"/>
+                    <a:lumOff val="40000"/>
+                  </a:schemeClr>
+                </a:solidFill>
+              </a:rPr>
+              <a:t>models</a:t>
+            </a:r>
+            <a:endParaRPr lang="fr-FR" u="sng" dirty="0">
+              <a:solidFill>
+                <a:schemeClr val="tx2">
+                  <a:lumMod val="60000"/>
+                  <a:lumOff val="40000"/>
+                </a:schemeClr>
+              </a:solidFill>
+            </a:endParaRPr>
           </a:p>
         </p:txBody>
       </p:sp>
@@ -3601,7 +3610,7 @@
         </p:nvSpPr>
         <p:spPr>
           <a:xfrm flipH="1">
-            <a:off x="112844" y="5446816"/>
+            <a:off x="1475656" y="5373216"/>
             <a:ext cx="1872208" cy="435463"/>
           </a:xfrm>
           <a:prstGeom prst="accentCallout2">
@@ -3635,26 +3644,79 @@
           <a:p>
             <a:pPr algn="ctr"/>
             <a:r>
-              <a:rPr lang="fr-FR" dirty="0" err="1" smtClean="0"/>
+              <a:rPr lang="fr-FR" u="sng" dirty="0" err="1">
+                <a:solidFill>
+                  <a:schemeClr val="tx2">
+                    <a:lumMod val="60000"/>
+                    <a:lumOff val="40000"/>
+                  </a:schemeClr>
+                </a:solidFill>
+              </a:rPr>
               <a:t>Execute</a:t>
             </a:r>
             <a:r>
-              <a:rPr lang="fr-FR" dirty="0" smtClean="0"/>
+              <a:rPr lang="fr-FR" u="sng" dirty="0">
+                <a:solidFill>
+                  <a:schemeClr val="tx2">
+                    <a:lumMod val="60000"/>
+                    <a:lumOff val="40000"/>
+                  </a:schemeClr>
+                </a:solidFill>
+              </a:rPr>
               <a:t> and </a:t>
             </a:r>
             <a:r>
-              <a:rPr lang="fr-FR" dirty="0" err="1" smtClean="0"/>
-              <a:t>debug</a:t>
-            </a:r>
-            <a:r>
-              <a:rPr lang="fr-FR" dirty="0" smtClean="0"/>
+              <a:rPr lang="fr-FR" u="sng" dirty="0" err="1" smtClean="0">
+                <a:solidFill>
+                  <a:schemeClr val="tx2">
+                    <a:lumMod val="60000"/>
+                    <a:lumOff val="40000"/>
+                  </a:schemeClr>
+                </a:solidFill>
+              </a:rPr>
+              <a:t>a</a:t>
+            </a:r>
+            <a:r>
+              <a:rPr lang="fr-FR" u="sng" dirty="0" err="1" smtClean="0">
+                <a:solidFill>
+                  <a:schemeClr val="tx2">
+                    <a:lumMod val="60000"/>
+                    <a:lumOff val="40000"/>
+                  </a:schemeClr>
+                </a:solidFill>
+              </a:rPr>
+              <a:t>nimate</a:t>
+            </a:r>
+            <a:r>
+              <a:rPr lang="fr-FR" u="sng" dirty="0" smtClean="0">
+                <a:solidFill>
+                  <a:schemeClr val="tx2">
+                    <a:lumMod val="60000"/>
+                    <a:lumOff val="40000"/>
+                  </a:schemeClr>
+                </a:solidFill>
+              </a:rPr>
               <a:t> </a:t>
             </a:r>
             <a:r>
-              <a:rPr lang="fr-FR" dirty="0" err="1" smtClean="0"/>
-              <a:t>Models</a:t>
-            </a:r>
-            <a:endParaRPr lang="fr-FR" dirty="0"/>
+              <a:rPr lang="fr-FR" u="sng" dirty="0" err="1" smtClean="0">
+                <a:solidFill>
+                  <a:schemeClr val="tx2">
+                    <a:lumMod val="60000"/>
+                    <a:lumOff val="40000"/>
+                  </a:schemeClr>
+                </a:solidFill>
+              </a:rPr>
+              <a:t>models</a:t>
+            </a:r>
+            <a:endParaRPr lang="fr-FR" u="sng" dirty="0">
+              <a:solidFill>
+                <a:schemeClr val="tx2">
+                  <a:lumMod val="60000"/>
+                  <a:lumOff val="40000"/>
+                </a:schemeClr>
+              </a:solidFill>
+            </a:endParaRPr>
           </a:p>
         </p:txBody>
       </p:sp>
@@ -3681,7 +3743,7 @@
         </p:blipFill>
         <p:spPr bwMode="auto">
           <a:xfrm>
-            <a:off x="459894" y="77609"/>
+            <a:off x="1691680" y="476672"/>
             <a:ext cx="583714" cy="644746"/>
           </a:xfrm>
           <a:prstGeom prst="rect">
@@ -3689,7 +3751,7 @@
           </a:prstGeom>
           <a:noFill/>
           <a:extLst>
-            <a:ext uri="{909E8E84-426E-40DD-AFC4-6F175D3DCCD1}">
+            <a:ext uri="{909E8E84-426E-40dd-AFC4-6F175D3DCCD1}">
               <a14:hiddenFill xmlns:a14="http://schemas.microsoft.com/office/drawing/2010/main">
                 <a:solidFill>
                   <a:srgbClr val="FFFFFF"/>
@@ -3722,7 +3784,7 @@
         </p:blipFill>
         <p:spPr bwMode="auto">
           <a:xfrm>
-            <a:off x="425869" y="3755015"/>
+            <a:off x="1657655" y="3684047"/>
             <a:ext cx="706827" cy="706827"/>
           </a:xfrm>
           <a:prstGeom prst="rect">
@@ -3730,7 +3792,7 @@
           </a:prstGeom>
           <a:noFill/>
           <a:extLst>
-            <a:ext uri="{909E8E84-426E-40DD-AFC4-6F175D3DCCD1}">
+            <a:ext uri="{909E8E84-426E-40dd-AFC4-6F175D3DCCD1}">
               <a14:hiddenFill xmlns:a14="http://schemas.microsoft.com/office/drawing/2010/main">
                 <a:solidFill>
                   <a:srgbClr val="FFFFFF"/>
@@ -3763,7 +3825,7 @@
         </p:blipFill>
         <p:spPr bwMode="auto">
           <a:xfrm>
-            <a:off x="6023121" y="77138"/>
+            <a:off x="5083706" y="476201"/>
             <a:ext cx="738544" cy="738544"/>
           </a:xfrm>
           <a:prstGeom prst="rect">
@@ -3771,7 +3833,7 @@
           </a:prstGeom>
           <a:noFill/>
           <a:extLst>
-            <a:ext uri="{909E8E84-426E-40DD-AFC4-6F175D3DCCD1}">
+            <a:ext uri="{909E8E84-426E-40dd-AFC4-6F175D3DCCD1}">
               <a14:hiddenFill xmlns:a14="http://schemas.microsoft.com/office/drawing/2010/main">
                 <a:solidFill>
                   <a:srgbClr val="FFFFFF"/>
@@ -3789,7 +3851,7 @@
         </p:nvSpPr>
         <p:spPr>
           <a:xfrm>
-            <a:off x="4355976" y="2708920"/>
+            <a:off x="4723666" y="2819951"/>
             <a:ext cx="144016" cy="1584175"/>
           </a:xfrm>
           <a:prstGeom prst="downArrow">
@@ -3829,8 +3891,8 @@
         </p:nvSpPr>
         <p:spPr>
           <a:xfrm>
-            <a:off x="4499992" y="2924944"/>
-            <a:ext cx="1813382" cy="646331"/>
+            <a:off x="4867682" y="3179991"/>
+            <a:ext cx="1368152" cy="923330"/>
           </a:xfrm>
           <a:prstGeom prst="rect">
             <a:avLst/>
@@ -3838,24 +3900,22 @@
           <a:noFill/>
         </p:spPr>
         <p:txBody>
-          <a:bodyPr wrap="none" rtlCol="0">
+          <a:bodyPr wrap="square" rtlCol="0">
             <a:spAutoFit/>
           </a:bodyPr>
           <a:lstStyle/>
           <a:p>
             <a:r>
               <a:rPr lang="fr-FR" dirty="0" err="1" smtClean="0"/>
-              <a:t>Automatically</a:t>
+              <a:t>Automatic</a:t>
             </a:r>
             <a:r>
               <a:rPr lang="fr-FR" dirty="0" smtClean="0"/>
               <a:t> </a:t>
             </a:r>
-          </a:p>
-          <a:p>
             <a:r>
               <a:rPr lang="fr-FR" dirty="0" err="1" smtClean="0"/>
-              <a:t>deploy</a:t>
+              <a:t>language</a:t>
             </a:r>
             <a:r>
               <a:rPr lang="fr-FR" dirty="0" smtClean="0"/>
@@ -3863,52 +3923,9 @@
             </a:r>
             <a:r>
               <a:rPr lang="fr-FR" dirty="0" err="1" smtClean="0"/>
-              <a:t>languages</a:t>
+              <a:t>deployment</a:t>
             </a:r>
             <a:endParaRPr lang="fr-FR" dirty="0"/>
-          </a:p>
-        </p:txBody>
-      </p:sp>
-      <p:sp>
-        <p:nvSpPr>
-          <p:cNvPr id="21" name="Rectangle 20"/>
-          <p:cNvSpPr/>
-          <p:nvPr/>
-        </p:nvSpPr>
-        <p:spPr>
-          <a:xfrm>
-            <a:off x="3139462" y="1016274"/>
-            <a:ext cx="822328" cy="683205"/>
-          </a:xfrm>
-          <a:prstGeom prst="rect">
-            <a:avLst/>
-          </a:prstGeom>
-          <a:solidFill>
-            <a:schemeClr val="bg1"/>
-          </a:solidFill>
-        </p:spPr>
-        <p:style>
-          <a:lnRef idx="2">
-            <a:schemeClr val="accent1">
-              <a:shade val="50000"/>
-            </a:schemeClr>
-          </a:lnRef>
-          <a:fillRef idx="1">
-            <a:schemeClr val="accent1"/>
-          </a:fillRef>
-          <a:effectRef idx="0">
-            <a:schemeClr val="accent1"/>
-          </a:effectRef>
-          <a:fontRef idx="minor">
-            <a:schemeClr val="lt1"/>
-          </a:fontRef>
-        </p:style>
-        <p:txBody>
-          <a:bodyPr rtlCol="0" anchor="ctr"/>
-          <a:lstStyle/>
-          <a:p>
-            <a:pPr algn="ctr"/>
-            <a:endParaRPr lang="fr-FR"/>
           </a:p>
         </p:txBody>
       </p:sp>
@@ -3920,8 +3937,8 @@
         </p:nvSpPr>
         <p:spPr>
           <a:xfrm>
-            <a:off x="6874064" y="1268760"/>
-            <a:ext cx="2162432" cy="435463"/>
+            <a:off x="6089626" y="1595815"/>
+            <a:ext cx="1442352" cy="435463"/>
           </a:xfrm>
           <a:prstGeom prst="accentCallout2">
             <a:avLst>
@@ -3954,77 +3971,44 @@
           <a:p>
             <a:pPr algn="ctr"/>
             <a:r>
-              <a:rPr lang="fr-FR" dirty="0" smtClean="0"/>
+              <a:rPr lang="fr-FR" dirty="0">
+                <a:solidFill>
+                  <a:schemeClr val="tx2">
+                    <a:lumMod val="60000"/>
+                    <a:lumOff val="40000"/>
+                  </a:schemeClr>
+                </a:solidFill>
+              </a:rPr>
               <a:t>Compose </a:t>
             </a:r>
-            <a:r>
-              <a:rPr lang="fr-FR" dirty="0" err="1" smtClean="0"/>
+          </a:p>
+          <a:p>
+            <a:pPr algn="ctr"/>
+            <a:r>
+              <a:rPr lang="fr-FR" dirty="0" err="1">
+                <a:solidFill>
+                  <a:schemeClr val="tx2">
+                    <a:lumMod val="60000"/>
+                    <a:lumOff val="40000"/>
+                  </a:schemeClr>
+                </a:solidFill>
+              </a:rPr>
               <a:t>languages</a:t>
             </a:r>
-            <a:endParaRPr lang="fr-FR" dirty="0"/>
-          </a:p>
-        </p:txBody>
-      </p:sp>
-      <p:sp>
-        <p:nvSpPr>
-          <p:cNvPr id="28" name="Légende à une bordure 2 27"/>
-          <p:cNvSpPr/>
-          <p:nvPr/>
-        </p:nvSpPr>
-        <p:spPr>
-          <a:xfrm flipH="1">
-            <a:off x="112844" y="6127653"/>
-            <a:ext cx="1872208" cy="435463"/>
-          </a:xfrm>
-          <a:prstGeom prst="accentCallout2">
-            <a:avLst>
-              <a:gd name="adj1" fmla="val 18750"/>
-              <a:gd name="adj2" fmla="val -8333"/>
-              <a:gd name="adj3" fmla="val 18750"/>
-              <a:gd name="adj4" fmla="val -16667"/>
-              <a:gd name="adj5" fmla="val -31173"/>
-              <a:gd name="adj6" fmla="val -42811"/>
-            </a:avLst>
-          </a:prstGeom>
-        </p:spPr>
-        <p:style>
-          <a:lnRef idx="2">
-            <a:schemeClr val="accent1"/>
-          </a:lnRef>
-          <a:fillRef idx="1">
-            <a:schemeClr val="lt1"/>
-          </a:fillRef>
-          <a:effectRef idx="0">
-            <a:schemeClr val="accent1"/>
-          </a:effectRef>
-          <a:fontRef idx="minor">
-            <a:schemeClr val="dk1"/>
-          </a:fontRef>
-        </p:style>
-        <p:txBody>
-          <a:bodyPr rtlCol="0" anchor="ctr"/>
-          <a:lstStyle/>
-          <a:p>
-            <a:pPr algn="ctr"/>
-            <a:r>
-              <a:rPr lang="fr-FR" dirty="0" err="1" smtClean="0"/>
-              <a:t>Animate</a:t>
-            </a:r>
-            <a:r>
-              <a:rPr lang="fr-FR" dirty="0" smtClean="0"/>
-              <a:t> </a:t>
-            </a:r>
-            <a:r>
-              <a:rPr lang="fr-FR" dirty="0" err="1" smtClean="0"/>
-              <a:t>Models</a:t>
-            </a:r>
-            <a:endParaRPr lang="fr-FR" dirty="0"/>
+            <a:endParaRPr lang="fr-FR" dirty="0">
+              <a:solidFill>
+                <a:schemeClr val="tx2">
+                  <a:lumMod val="60000"/>
+                  <a:lumOff val="40000"/>
+                </a:schemeClr>
+              </a:solidFill>
+            </a:endParaRPr>
           </a:p>
         </p:txBody>
       </p:sp>
       <p:pic>
         <p:nvPicPr>
-          <p:cNvPr id="1027" name="Picture 3" descr="D:\Users\dvojtise\Dropbox\gemoc-anr-ins-doc\templates\Img\png\IconeGemocLanguage.png"/>
+          <p:cNvPr id="1026" name="Picture 2" descr="D:\Users\dvojtise\Dropbox\gemoc-anr-ins-doc\templates\Img\png\IconeGemocModel.png"/>
           <p:cNvPicPr>
             <a:picLocks noChangeAspect="1" noChangeArrowheads="1"/>
           </p:cNvPicPr>
@@ -4045,91 +4029,7 @@
         </p:blipFill>
         <p:spPr bwMode="auto">
           <a:xfrm>
-            <a:off x="3181637" y="1016274"/>
-            <a:ext cx="737978" cy="641667"/>
-          </a:xfrm>
-          <a:prstGeom prst="rect">
-            <a:avLst/>
-          </a:prstGeom>
-          <a:noFill/>
-          <a:extLst>
-            <a:ext uri="{909E8E84-426E-40DD-AFC4-6F175D3DCCD1}">
-              <a14:hiddenFill xmlns:a14="http://schemas.microsoft.com/office/drawing/2010/main">
-                <a:solidFill>
-                  <a:srgbClr val="FFFFFF"/>
-                </a:solidFill>
-              </a14:hiddenFill>
-            </a:ext>
-          </a:extLst>
-        </p:spPr>
-      </p:pic>
-      <p:sp>
-        <p:nvSpPr>
-          <p:cNvPr id="30" name="Rectangle 29"/>
-          <p:cNvSpPr/>
-          <p:nvPr/>
-        </p:nvSpPr>
-        <p:spPr>
-          <a:xfrm>
-            <a:off x="3097287" y="4688364"/>
-            <a:ext cx="682625" cy="758452"/>
-          </a:xfrm>
-          <a:prstGeom prst="rect">
-            <a:avLst/>
-          </a:prstGeom>
-          <a:solidFill>
-            <a:schemeClr val="bg1"/>
-          </a:solidFill>
-        </p:spPr>
-        <p:style>
-          <a:lnRef idx="2">
-            <a:schemeClr val="accent1">
-              <a:shade val="50000"/>
-            </a:schemeClr>
-          </a:lnRef>
-          <a:fillRef idx="1">
-            <a:schemeClr val="accent1"/>
-          </a:fillRef>
-          <a:effectRef idx="0">
-            <a:schemeClr val="accent1"/>
-          </a:effectRef>
-          <a:fontRef idx="minor">
-            <a:schemeClr val="lt1"/>
-          </a:fontRef>
-        </p:style>
-        <p:txBody>
-          <a:bodyPr rtlCol="0" anchor="ctr"/>
-          <a:lstStyle/>
-          <a:p>
-            <a:pPr algn="ctr"/>
-            <a:endParaRPr lang="fr-FR"/>
-          </a:p>
-        </p:txBody>
-      </p:sp>
-      <p:pic>
-        <p:nvPicPr>
-          <p:cNvPr id="1026" name="Picture 2" descr="D:\Users\dvojtise\Dropbox\gemoc-anr-ins-doc\templates\Img\png\IconeGemocModel.png"/>
-          <p:cNvPicPr>
-            <a:picLocks noChangeAspect="1" noChangeArrowheads="1"/>
-          </p:cNvPicPr>
-          <p:nvPr/>
-        </p:nvPicPr>
-        <p:blipFill>
-          <a:blip r:embed="rId6" cstate="print">
-            <a:extLst>
-              <a:ext uri="{28A0092B-C50C-407E-A947-70E740481C1C}">
-                <a14:useLocalDpi xmlns:a14="http://schemas.microsoft.com/office/drawing/2010/main" val="0"/>
-              </a:ext>
-            </a:extLst>
-          </a:blip>
-          <a:srcRect/>
-          <a:stretch>
-            <a:fillRect/>
-          </a:stretch>
-        </p:blipFill>
-        <p:spPr bwMode="auto">
-          <a:xfrm>
-            <a:off x="3139461" y="4718494"/>
+            <a:off x="4507642" y="4654176"/>
             <a:ext cx="558182" cy="694443"/>
           </a:xfrm>
           <a:prstGeom prst="rect">
@@ -4137,7 +4037,7 @@
           </a:prstGeom>
           <a:noFill/>
           <a:extLst>
-            <a:ext uri="{909E8E84-426E-40DD-AFC4-6F175D3DCCD1}">
+            <a:ext uri="{909E8E84-426E-40dd-AFC4-6F175D3DCCD1}">
               <a14:hiddenFill xmlns:a14="http://schemas.microsoft.com/office/drawing/2010/main">
                 <a:solidFill>
                   <a:srgbClr val="FFFFFF"/>
@@ -4147,6 +4047,395 @@
           </a:extLst>
         </p:spPr>
       </p:pic>
+      <p:grpSp>
+        <p:nvGrpSpPr>
+          <p:cNvPr id="3" name="Grouper 2"/>
+          <p:cNvGrpSpPr/>
+          <p:nvPr/>
+        </p:nvGrpSpPr>
+        <p:grpSpPr>
+          <a:xfrm>
+            <a:off x="4147602" y="1451799"/>
+            <a:ext cx="1296143" cy="1222395"/>
+            <a:chOff x="3131840" y="1412776"/>
+            <a:chExt cx="1296143" cy="1222395"/>
+          </a:xfrm>
+        </p:grpSpPr>
+        <p:pic>
+          <p:nvPicPr>
+            <p:cNvPr id="1027" name="Picture 3" descr="D:\Users\dvojtise\Dropbox\gemoc-anr-ins-doc\templates\Img\png\IconeGemocLanguage.png"/>
+            <p:cNvPicPr>
+              <a:picLocks noChangeAspect="1" noChangeArrowheads="1"/>
+            </p:cNvPicPr>
+            <p:nvPr/>
+          </p:nvPicPr>
+          <p:blipFill>
+            <a:blip r:embed="rId6" cstate="print">
+              <a:extLst>
+                <a:ext uri="{28A0092B-C50C-407E-A947-70E740481C1C}">
+                  <a14:useLocalDpi xmlns:a14="http://schemas.microsoft.com/office/drawing/2010/main" val="0"/>
+                </a:ext>
+              </a:extLst>
+            </a:blip>
+            <a:srcRect/>
+            <a:stretch>
+              <a:fillRect/>
+            </a:stretch>
+          </p:blipFill>
+          <p:spPr bwMode="auto">
+            <a:xfrm>
+              <a:off x="3419872" y="1412776"/>
+              <a:ext cx="737978" cy="641667"/>
+            </a:xfrm>
+            <a:prstGeom prst="rect">
+              <a:avLst/>
+            </a:prstGeom>
+            <a:noFill/>
+            <a:ln>
+              <a:noFill/>
+            </a:ln>
+            <a:extLst>
+              <a:ext uri="{909E8E84-426E-40dd-AFC4-6F175D3DCCD1}">
+                <a14:hiddenFill xmlns:a14="http://schemas.microsoft.com/office/drawing/2010/main">
+                  <a:solidFill>
+                    <a:srgbClr val="FFFFFF"/>
+                  </a:solidFill>
+                </a14:hiddenFill>
+              </a:ext>
+            </a:extLst>
+          </p:spPr>
+        </p:pic>
+        <p:sp>
+          <p:nvSpPr>
+            <p:cNvPr id="2" name="ZoneTexte 1"/>
+            <p:cNvSpPr txBox="1"/>
+            <p:nvPr/>
+          </p:nvSpPr>
+          <p:spPr>
+            <a:xfrm>
+              <a:off x="3131840" y="1988840"/>
+              <a:ext cx="1296143" cy="646331"/>
+            </a:xfrm>
+            <a:prstGeom prst="rect">
+              <a:avLst/>
+            </a:prstGeom>
+            <a:noFill/>
+            <a:ln>
+              <a:noFill/>
+            </a:ln>
+          </p:spPr>
+          <p:style>
+            <a:lnRef idx="2">
+              <a:schemeClr val="accent1"/>
+            </a:lnRef>
+            <a:fillRef idx="1">
+              <a:schemeClr val="lt1"/>
+            </a:fillRef>
+            <a:effectRef idx="0">
+              <a:schemeClr val="accent1"/>
+            </a:effectRef>
+            <a:fontRef idx="minor">
+              <a:schemeClr val="dk1"/>
+            </a:fontRef>
+          </p:style>
+          <p:txBody>
+            <a:bodyPr rtlCol="0" anchor="ctr"/>
+            <a:lstStyle>
+              <a:defPPr>
+                <a:defRPr lang="fr-FR"/>
+              </a:defPPr>
+              <a:lvl1pPr algn="ctr">
+                <a:defRPr u="sng">
+                  <a:solidFill>
+                    <a:schemeClr val="tx2">
+                      <a:lumMod val="60000"/>
+                      <a:lumOff val="40000"/>
+                    </a:schemeClr>
+                  </a:solidFill>
+                </a:defRPr>
+              </a:lvl1pPr>
+              <a:lvl2pPr>
+                <a:defRPr>
+                  <a:solidFill>
+                    <a:schemeClr val="dk1"/>
+                  </a:solidFill>
+                </a:defRPr>
+              </a:lvl2pPr>
+              <a:lvl3pPr>
+                <a:defRPr>
+                  <a:solidFill>
+                    <a:schemeClr val="dk1"/>
+                  </a:solidFill>
+                </a:defRPr>
+              </a:lvl3pPr>
+              <a:lvl4pPr>
+                <a:defRPr>
+                  <a:solidFill>
+                    <a:schemeClr val="dk1"/>
+                  </a:solidFill>
+                </a:defRPr>
+              </a:lvl4pPr>
+              <a:lvl5pPr>
+                <a:defRPr>
+                  <a:solidFill>
+                    <a:schemeClr val="dk1"/>
+                  </a:solidFill>
+                </a:defRPr>
+              </a:lvl5pPr>
+              <a:lvl6pPr>
+                <a:defRPr>
+                  <a:solidFill>
+                    <a:schemeClr val="dk1"/>
+                  </a:solidFill>
+                </a:defRPr>
+              </a:lvl6pPr>
+              <a:lvl7pPr>
+                <a:defRPr>
+                  <a:solidFill>
+                    <a:schemeClr val="dk1"/>
+                  </a:solidFill>
+                </a:defRPr>
+              </a:lvl7pPr>
+              <a:lvl8pPr>
+                <a:defRPr>
+                  <a:solidFill>
+                    <a:schemeClr val="dk1"/>
+                  </a:solidFill>
+                </a:defRPr>
+              </a:lvl8pPr>
+              <a:lvl9pPr>
+                <a:defRPr>
+                  <a:solidFill>
+                    <a:schemeClr val="dk1"/>
+                  </a:solidFill>
+                </a:defRPr>
+              </a:lvl9pPr>
+            </a:lstStyle>
+            <a:p>
+              <a:r>
+                <a:rPr lang="fr-FR" dirty="0" err="1"/>
+                <a:t>Language</a:t>
+              </a:r>
+              <a:r>
+                <a:rPr lang="fr-FR" dirty="0"/>
+                <a:t> </a:t>
+              </a:r>
+              <a:r>
+                <a:rPr lang="fr-FR" dirty="0" err="1"/>
+                <a:t>Workbench</a:t>
+              </a:r>
+              <a:endParaRPr lang="fr-FR" dirty="0"/>
+            </a:p>
+          </p:txBody>
+        </p:sp>
+      </p:grpSp>
+      <p:sp>
+        <p:nvSpPr>
+          <p:cNvPr id="29" name="ZoneTexte 28"/>
+          <p:cNvSpPr txBox="1"/>
+          <p:nvPr/>
+        </p:nvSpPr>
+        <p:spPr>
+          <a:xfrm>
+            <a:off x="4139982" y="5308898"/>
+            <a:ext cx="1296143" cy="646331"/>
+          </a:xfrm>
+          <a:prstGeom prst="rect">
+            <a:avLst/>
+          </a:prstGeom>
+          <a:noFill/>
+          <a:ln>
+            <a:noFill/>
+          </a:ln>
+        </p:spPr>
+        <p:style>
+          <a:lnRef idx="2">
+            <a:schemeClr val="accent1"/>
+          </a:lnRef>
+          <a:fillRef idx="1">
+            <a:schemeClr val="lt1"/>
+          </a:fillRef>
+          <a:effectRef idx="0">
+            <a:schemeClr val="accent1"/>
+          </a:effectRef>
+          <a:fontRef idx="minor">
+            <a:schemeClr val="dk1"/>
+          </a:fontRef>
+        </p:style>
+        <p:txBody>
+          <a:bodyPr rtlCol="0" anchor="ctr"/>
+          <a:lstStyle>
+            <a:defPPr>
+              <a:defRPr lang="fr-FR"/>
+            </a:defPPr>
+            <a:lvl1pPr algn="ctr">
+              <a:defRPr u="sng">
+                <a:solidFill>
+                  <a:schemeClr val="tx2">
+                    <a:lumMod val="60000"/>
+                    <a:lumOff val="40000"/>
+                  </a:schemeClr>
+                </a:solidFill>
+              </a:defRPr>
+            </a:lvl1pPr>
+            <a:lvl2pPr>
+              <a:defRPr>
+                <a:solidFill>
+                  <a:schemeClr val="dk1"/>
+                </a:solidFill>
+              </a:defRPr>
+            </a:lvl2pPr>
+            <a:lvl3pPr>
+              <a:defRPr>
+                <a:solidFill>
+                  <a:schemeClr val="dk1"/>
+                </a:solidFill>
+              </a:defRPr>
+            </a:lvl3pPr>
+            <a:lvl4pPr>
+              <a:defRPr>
+                <a:solidFill>
+                  <a:schemeClr val="dk1"/>
+                </a:solidFill>
+              </a:defRPr>
+            </a:lvl4pPr>
+            <a:lvl5pPr>
+              <a:defRPr>
+                <a:solidFill>
+                  <a:schemeClr val="dk1"/>
+                </a:solidFill>
+              </a:defRPr>
+            </a:lvl5pPr>
+            <a:lvl6pPr>
+              <a:defRPr>
+                <a:solidFill>
+                  <a:schemeClr val="dk1"/>
+                </a:solidFill>
+              </a:defRPr>
+            </a:lvl6pPr>
+            <a:lvl7pPr>
+              <a:defRPr>
+                <a:solidFill>
+                  <a:schemeClr val="dk1"/>
+                </a:solidFill>
+              </a:defRPr>
+            </a:lvl7pPr>
+            <a:lvl8pPr>
+              <a:defRPr>
+                <a:solidFill>
+                  <a:schemeClr val="dk1"/>
+                </a:solidFill>
+              </a:defRPr>
+            </a:lvl8pPr>
+            <a:lvl9pPr>
+              <a:defRPr>
+                <a:solidFill>
+                  <a:schemeClr val="dk1"/>
+                </a:solidFill>
+              </a:defRPr>
+            </a:lvl9pPr>
+          </a:lstStyle>
+          <a:p>
+            <a:r>
+              <a:rPr lang="fr-FR" dirty="0" err="1"/>
+              <a:t>Modeling</a:t>
+            </a:r>
+            <a:endParaRPr lang="fr-FR" dirty="0"/>
+          </a:p>
+          <a:p>
+            <a:r>
+              <a:rPr lang="fr-FR" dirty="0" err="1"/>
+              <a:t>Workbench</a:t>
+            </a:r>
+            <a:endParaRPr lang="fr-FR" dirty="0"/>
+          </a:p>
+        </p:txBody>
+      </p:sp>
+      <p:sp>
+        <p:nvSpPr>
+          <p:cNvPr id="23" name="Légende à une bordure 2 22"/>
+          <p:cNvSpPr/>
+          <p:nvPr/>
+        </p:nvSpPr>
+        <p:spPr>
+          <a:xfrm>
+            <a:off x="6084168" y="4653136"/>
+            <a:ext cx="1442352" cy="435463"/>
+          </a:xfrm>
+          <a:prstGeom prst="accentCallout2">
+            <a:avLst>
+              <a:gd name="adj1" fmla="val 18750"/>
+              <a:gd name="adj2" fmla="val -8333"/>
+              <a:gd name="adj3" fmla="val 18750"/>
+              <a:gd name="adj4" fmla="val -16667"/>
+              <a:gd name="adj5" fmla="val 57241"/>
+              <a:gd name="adj6" fmla="val -47363"/>
+            </a:avLst>
+          </a:prstGeom>
+        </p:spPr>
+        <p:style>
+          <a:lnRef idx="2">
+            <a:schemeClr val="accent1"/>
+          </a:lnRef>
+          <a:fillRef idx="1">
+            <a:schemeClr val="lt1"/>
+          </a:fillRef>
+          <a:effectRef idx="0">
+            <a:schemeClr val="accent1"/>
+          </a:effectRef>
+          <a:fontRef idx="minor">
+            <a:schemeClr val="dk1"/>
+          </a:fontRef>
+        </p:style>
+        <p:txBody>
+          <a:bodyPr rtlCol="0" anchor="ctr"/>
+          <a:lstStyle/>
+          <a:p>
+            <a:pPr algn="ctr"/>
+            <a:r>
+              <a:rPr lang="fr-FR" dirty="0" err="1" smtClean="0">
+                <a:solidFill>
+                  <a:schemeClr val="tx2">
+                    <a:lumMod val="60000"/>
+                    <a:lumOff val="40000"/>
+                  </a:schemeClr>
+                </a:solidFill>
+              </a:rPr>
+              <a:t>Coordinate</a:t>
+            </a:r>
+            <a:endParaRPr lang="fr-FR" dirty="0">
+              <a:solidFill>
+                <a:schemeClr val="tx2">
+                  <a:lumMod val="60000"/>
+                  <a:lumOff val="40000"/>
+                </a:schemeClr>
+              </a:solidFill>
+            </a:endParaRPr>
+          </a:p>
+          <a:p>
+            <a:pPr algn="ctr"/>
+            <a:r>
+              <a:rPr lang="fr-FR" dirty="0" err="1" smtClean="0">
+                <a:solidFill>
+                  <a:schemeClr val="tx2">
+                    <a:lumMod val="60000"/>
+                    <a:lumOff val="40000"/>
+                  </a:schemeClr>
+                </a:solidFill>
+              </a:rPr>
+              <a:t>models</a:t>
+            </a:r>
+            <a:endParaRPr lang="fr-FR" dirty="0">
+              <a:solidFill>
+                <a:schemeClr val="tx2">
+                  <a:lumMod val="60000"/>
+                  <a:lumOff val="40000"/>
+                </a:schemeClr>
+              </a:solidFill>
+            </a:endParaRPr>
+          </a:p>
+        </p:txBody>
+      </p:sp>
     </p:spTree>
     <p:extLst>
       <p:ext uri="{BB962C8B-B14F-4D97-AF65-F5344CB8AC3E}">
@@ -4157,6 +4446,13 @@
   <p:clrMapOvr>
     <a:masterClrMapping/>
   </p:clrMapOvr>
+  <p:timing>
+    <p:tnLst>
+      <p:par>
+        <p:cTn xmlns:p14="http://schemas.microsoft.com/office/powerpoint/2010/main" id="1" dur="indefinite" restart="never" nodeType="tmRoot"/>
+      </p:par>
+    </p:tnLst>
+  </p:timing>
 </p:sld>
 </file>
 

</xml_diff>

<commit_message>
changed text of global picture make some text clickable (added underline on text)
</commit_message>
<xml_diff>
--- a/images/intro/GemocWorkbenchesGlobalPicture.pptx
+++ b/images/intro/GemocWorkbenchesGlobalPicture.pptx
@@ -288,7 +288,7 @@
           <a:p>
             <a:fld id="{3CB80180-027D-416E-ABC6-0AB7712C8529}" type="datetimeFigureOut">
               <a:rPr lang="fr-FR" smtClean="0"/>
-              <a:t>03/06/15</a:t>
+              <a:t>25/11/2015</a:t>
             </a:fld>
             <a:endParaRPr lang="fr-FR"/>
           </a:p>
@@ -330,7 +330,7 @@
           <a:p>
             <a:fld id="{4DB7CC70-FF22-4833-BD59-CCF23EF9E81E}" type="slidenum">
               <a:rPr lang="fr-FR" smtClean="0"/>
-              <a:t>‹#›</a:t>
+              <a:t>‹N°›</a:t>
             </a:fld>
             <a:endParaRPr lang="fr-FR"/>
           </a:p>
@@ -458,7 +458,7 @@
           <a:p>
             <a:fld id="{3CB80180-027D-416E-ABC6-0AB7712C8529}" type="datetimeFigureOut">
               <a:rPr lang="fr-FR" smtClean="0"/>
-              <a:t>03/06/15</a:t>
+              <a:t>25/11/2015</a:t>
             </a:fld>
             <a:endParaRPr lang="fr-FR"/>
           </a:p>
@@ -500,7 +500,7 @@
           <a:p>
             <a:fld id="{4DB7CC70-FF22-4833-BD59-CCF23EF9E81E}" type="slidenum">
               <a:rPr lang="fr-FR" smtClean="0"/>
-              <a:t>‹#›</a:t>
+              <a:t>‹N°›</a:t>
             </a:fld>
             <a:endParaRPr lang="fr-FR"/>
           </a:p>
@@ -638,7 +638,7 @@
           <a:p>
             <a:fld id="{3CB80180-027D-416E-ABC6-0AB7712C8529}" type="datetimeFigureOut">
               <a:rPr lang="fr-FR" smtClean="0"/>
-              <a:t>03/06/15</a:t>
+              <a:t>25/11/2015</a:t>
             </a:fld>
             <a:endParaRPr lang="fr-FR"/>
           </a:p>
@@ -680,7 +680,7 @@
           <a:p>
             <a:fld id="{4DB7CC70-FF22-4833-BD59-CCF23EF9E81E}" type="slidenum">
               <a:rPr lang="fr-FR" smtClean="0"/>
-              <a:t>‹#›</a:t>
+              <a:t>‹N°›</a:t>
             </a:fld>
             <a:endParaRPr lang="fr-FR"/>
           </a:p>
@@ -808,7 +808,7 @@
           <a:p>
             <a:fld id="{3CB80180-027D-416E-ABC6-0AB7712C8529}" type="datetimeFigureOut">
               <a:rPr lang="fr-FR" smtClean="0"/>
-              <a:t>03/06/15</a:t>
+              <a:t>25/11/2015</a:t>
             </a:fld>
             <a:endParaRPr lang="fr-FR"/>
           </a:p>
@@ -850,7 +850,7 @@
           <a:p>
             <a:fld id="{4DB7CC70-FF22-4833-BD59-CCF23EF9E81E}" type="slidenum">
               <a:rPr lang="fr-FR" smtClean="0"/>
-              <a:t>‹#›</a:t>
+              <a:t>‹N°›</a:t>
             </a:fld>
             <a:endParaRPr lang="fr-FR"/>
           </a:p>
@@ -1054,7 +1054,7 @@
           <a:p>
             <a:fld id="{3CB80180-027D-416E-ABC6-0AB7712C8529}" type="datetimeFigureOut">
               <a:rPr lang="fr-FR" smtClean="0"/>
-              <a:t>03/06/15</a:t>
+              <a:t>25/11/2015</a:t>
             </a:fld>
             <a:endParaRPr lang="fr-FR"/>
           </a:p>
@@ -1096,7 +1096,7 @@
           <a:p>
             <a:fld id="{4DB7CC70-FF22-4833-BD59-CCF23EF9E81E}" type="slidenum">
               <a:rPr lang="fr-FR" smtClean="0"/>
-              <a:t>‹#›</a:t>
+              <a:t>‹N°›</a:t>
             </a:fld>
             <a:endParaRPr lang="fr-FR"/>
           </a:p>
@@ -1342,7 +1342,7 @@
           <a:p>
             <a:fld id="{3CB80180-027D-416E-ABC6-0AB7712C8529}" type="datetimeFigureOut">
               <a:rPr lang="fr-FR" smtClean="0"/>
-              <a:t>03/06/15</a:t>
+              <a:t>25/11/2015</a:t>
             </a:fld>
             <a:endParaRPr lang="fr-FR"/>
           </a:p>
@@ -1384,7 +1384,7 @@
           <a:p>
             <a:fld id="{4DB7CC70-FF22-4833-BD59-CCF23EF9E81E}" type="slidenum">
               <a:rPr lang="fr-FR" smtClean="0"/>
-              <a:t>‹#›</a:t>
+              <a:t>‹N°›</a:t>
             </a:fld>
             <a:endParaRPr lang="fr-FR"/>
           </a:p>
@@ -1764,7 +1764,7 @@
           <a:p>
             <a:fld id="{3CB80180-027D-416E-ABC6-0AB7712C8529}" type="datetimeFigureOut">
               <a:rPr lang="fr-FR" smtClean="0"/>
-              <a:t>03/06/15</a:t>
+              <a:t>25/11/2015</a:t>
             </a:fld>
             <a:endParaRPr lang="fr-FR"/>
           </a:p>
@@ -1806,7 +1806,7 @@
           <a:p>
             <a:fld id="{4DB7CC70-FF22-4833-BD59-CCF23EF9E81E}" type="slidenum">
               <a:rPr lang="fr-FR" smtClean="0"/>
-              <a:t>‹#›</a:t>
+              <a:t>‹N°›</a:t>
             </a:fld>
             <a:endParaRPr lang="fr-FR"/>
           </a:p>
@@ -1882,7 +1882,7 @@
           <a:p>
             <a:fld id="{3CB80180-027D-416E-ABC6-0AB7712C8529}" type="datetimeFigureOut">
               <a:rPr lang="fr-FR" smtClean="0"/>
-              <a:t>03/06/15</a:t>
+              <a:t>25/11/2015</a:t>
             </a:fld>
             <a:endParaRPr lang="fr-FR"/>
           </a:p>
@@ -1924,7 +1924,7 @@
           <a:p>
             <a:fld id="{4DB7CC70-FF22-4833-BD59-CCF23EF9E81E}" type="slidenum">
               <a:rPr lang="fr-FR" smtClean="0"/>
-              <a:t>‹#›</a:t>
+              <a:t>‹N°›</a:t>
             </a:fld>
             <a:endParaRPr lang="fr-FR"/>
           </a:p>
@@ -1977,7 +1977,7 @@
           <a:p>
             <a:fld id="{3CB80180-027D-416E-ABC6-0AB7712C8529}" type="datetimeFigureOut">
               <a:rPr lang="fr-FR" smtClean="0"/>
-              <a:t>03/06/15</a:t>
+              <a:t>25/11/2015</a:t>
             </a:fld>
             <a:endParaRPr lang="fr-FR"/>
           </a:p>
@@ -2019,7 +2019,7 @@
           <a:p>
             <a:fld id="{4DB7CC70-FF22-4833-BD59-CCF23EF9E81E}" type="slidenum">
               <a:rPr lang="fr-FR" smtClean="0"/>
-              <a:t>‹#›</a:t>
+              <a:t>‹N°›</a:t>
             </a:fld>
             <a:endParaRPr lang="fr-FR"/>
           </a:p>
@@ -2254,7 +2254,7 @@
           <a:p>
             <a:fld id="{3CB80180-027D-416E-ABC6-0AB7712C8529}" type="datetimeFigureOut">
               <a:rPr lang="fr-FR" smtClean="0"/>
-              <a:t>03/06/15</a:t>
+              <a:t>25/11/2015</a:t>
             </a:fld>
             <a:endParaRPr lang="fr-FR"/>
           </a:p>
@@ -2296,7 +2296,7 @@
           <a:p>
             <a:fld id="{4DB7CC70-FF22-4833-BD59-CCF23EF9E81E}" type="slidenum">
               <a:rPr lang="fr-FR" smtClean="0"/>
-              <a:t>‹#›</a:t>
+              <a:t>‹N°›</a:t>
             </a:fld>
             <a:endParaRPr lang="fr-FR"/>
           </a:p>
@@ -2507,7 +2507,7 @@
           <a:p>
             <a:fld id="{3CB80180-027D-416E-ABC6-0AB7712C8529}" type="datetimeFigureOut">
               <a:rPr lang="fr-FR" smtClean="0"/>
-              <a:t>03/06/15</a:t>
+              <a:t>25/11/2015</a:t>
             </a:fld>
             <a:endParaRPr lang="fr-FR"/>
           </a:p>
@@ -2549,7 +2549,7 @@
           <a:p>
             <a:fld id="{4DB7CC70-FF22-4833-BD59-CCF23EF9E81E}" type="slidenum">
               <a:rPr lang="fr-FR" smtClean="0"/>
-              <a:t>‹#›</a:t>
+              <a:t>‹N°›</a:t>
             </a:fld>
             <a:endParaRPr lang="fr-FR"/>
           </a:p>
@@ -2720,7 +2720,7 @@
           <a:p>
             <a:fld id="{3CB80180-027D-416E-ABC6-0AB7712C8529}" type="datetimeFigureOut">
               <a:rPr lang="fr-FR" smtClean="0"/>
-              <a:t>03/06/15</a:t>
+              <a:t>25/11/2015</a:t>
             </a:fld>
             <a:endParaRPr lang="fr-FR"/>
           </a:p>
@@ -2798,7 +2798,7 @@
           <a:p>
             <a:fld id="{4DB7CC70-FF22-4833-BD59-CCF23EF9E81E}" type="slidenum">
               <a:rPr lang="fr-FR" smtClean="0"/>
-              <a:t>‹#›</a:t>
+              <a:t>‹N°›</a:t>
             </a:fld>
             <a:endParaRPr lang="fr-FR"/>
           </a:p>
@@ -3610,8 +3610,8 @@
         </p:nvSpPr>
         <p:spPr>
           <a:xfrm flipH="1">
-            <a:off x="1475656" y="5373216"/>
-            <a:ext cx="1872208" cy="435463"/>
+            <a:off x="1344630" y="5373216"/>
+            <a:ext cx="2003234" cy="435463"/>
           </a:xfrm>
           <a:prstGeom prst="accentCallout2">
             <a:avLst>
@@ -3644,7 +3644,7 @@
           <a:p>
             <a:pPr algn="ctr"/>
             <a:r>
-              <a:rPr lang="fr-FR" u="sng" dirty="0" err="1">
+              <a:rPr lang="fr-FR" u="sng" dirty="0" err="1" smtClean="0">
                 <a:solidFill>
                   <a:schemeClr val="tx2">
                     <a:lumMod val="60000"/>
@@ -3655,7 +3655,7 @@
               <a:t>Execute</a:t>
             </a:r>
             <a:r>
-              <a:rPr lang="fr-FR" u="sng" dirty="0">
+              <a:rPr lang="fr-FR" u="sng" dirty="0" smtClean="0">
                 <a:solidFill>
                   <a:schemeClr val="tx2">
                     <a:lumMod val="60000"/>
@@ -3663,7 +3663,7 @@
                   </a:schemeClr>
                 </a:solidFill>
               </a:rPr>
-              <a:t> and </a:t>
+              <a:t>, </a:t>
             </a:r>
             <a:r>
               <a:rPr lang="fr-FR" u="sng" dirty="0" err="1" smtClean="0">
@@ -3674,10 +3674,10 @@
                   </a:schemeClr>
                 </a:solidFill>
               </a:rPr>
-              <a:t>a</a:t>
-            </a:r>
-            <a:r>
-              <a:rPr lang="fr-FR" u="sng" dirty="0" err="1" smtClean="0">
+              <a:t>Animate</a:t>
+            </a:r>
+            <a:r>
+              <a:rPr lang="fr-FR" u="sng" dirty="0" smtClean="0">
                 <a:solidFill>
                   <a:schemeClr val="tx2">
                     <a:lumMod val="60000"/>
@@ -3685,7 +3685,29 @@
                   </a:schemeClr>
                 </a:solidFill>
               </a:rPr>
-              <a:t>nimate</a:t>
+              <a:t> and </a:t>
+            </a:r>
+            <a:r>
+              <a:rPr lang="fr-FR" u="sng" dirty="0" err="1">
+                <a:solidFill>
+                  <a:schemeClr val="tx2">
+                    <a:lumMod val="60000"/>
+                    <a:lumOff val="40000"/>
+                  </a:schemeClr>
+                </a:solidFill>
+              </a:rPr>
+              <a:t>D</a:t>
+            </a:r>
+            <a:r>
+              <a:rPr lang="fr-FR" u="sng" dirty="0" err="1" smtClean="0">
+                <a:solidFill>
+                  <a:schemeClr val="tx2">
+                    <a:lumMod val="60000"/>
+                    <a:lumOff val="40000"/>
+                  </a:schemeClr>
+                </a:solidFill>
+              </a:rPr>
+              <a:t>ebug</a:t>
             </a:r>
             <a:r>
               <a:rPr lang="fr-FR" u="sng" dirty="0" smtClean="0">
@@ -3751,7 +3773,7 @@
           </a:prstGeom>
           <a:noFill/>
           <a:extLst>
-            <a:ext uri="{909E8E84-426E-40dd-AFC4-6F175D3DCCD1}">
+            <a:ext uri="{909E8E84-426E-40DD-AFC4-6F175D3DCCD1}">
               <a14:hiddenFill xmlns:a14="http://schemas.microsoft.com/office/drawing/2010/main">
                 <a:solidFill>
                   <a:srgbClr val="FFFFFF"/>
@@ -3792,7 +3814,7 @@
           </a:prstGeom>
           <a:noFill/>
           <a:extLst>
-            <a:ext uri="{909E8E84-426E-40dd-AFC4-6F175D3DCCD1}">
+            <a:ext uri="{909E8E84-426E-40DD-AFC4-6F175D3DCCD1}">
               <a14:hiddenFill xmlns:a14="http://schemas.microsoft.com/office/drawing/2010/main">
                 <a:solidFill>
                   <a:srgbClr val="FFFFFF"/>
@@ -3833,7 +3855,7 @@
           </a:prstGeom>
           <a:noFill/>
           <a:extLst>
-            <a:ext uri="{909E8E84-426E-40dd-AFC4-6F175D3DCCD1}">
+            <a:ext uri="{909E8E84-426E-40DD-AFC4-6F175D3DCCD1}">
               <a14:hiddenFill xmlns:a14="http://schemas.microsoft.com/office/drawing/2010/main">
                 <a:solidFill>
                   <a:srgbClr val="FFFFFF"/>
@@ -3906,26 +3928,26 @@
           <a:lstStyle/>
           <a:p>
             <a:r>
-              <a:rPr lang="fr-FR" dirty="0" err="1" smtClean="0"/>
+              <a:rPr lang="fr-FR" u="sng" dirty="0" err="1" smtClean="0"/>
               <a:t>Automatic</a:t>
             </a:r>
             <a:r>
-              <a:rPr lang="fr-FR" dirty="0" smtClean="0"/>
+              <a:rPr lang="fr-FR" u="sng" dirty="0" smtClean="0"/>
               <a:t> </a:t>
             </a:r>
             <a:r>
-              <a:rPr lang="fr-FR" dirty="0" err="1" smtClean="0"/>
+              <a:rPr lang="fr-FR" u="sng" dirty="0" err="1" smtClean="0"/>
               <a:t>language</a:t>
             </a:r>
             <a:r>
-              <a:rPr lang="fr-FR" dirty="0" smtClean="0"/>
+              <a:rPr lang="fr-FR" u="sng" dirty="0" smtClean="0"/>
               <a:t> </a:t>
             </a:r>
             <a:r>
-              <a:rPr lang="fr-FR" dirty="0" err="1" smtClean="0"/>
+              <a:rPr lang="fr-FR" u="sng" dirty="0" err="1" smtClean="0"/>
               <a:t>deployment</a:t>
             </a:r>
-            <a:endParaRPr lang="fr-FR" dirty="0"/>
+            <a:endParaRPr lang="fr-FR" u="sng" dirty="0"/>
           </a:p>
         </p:txBody>
       </p:sp>
@@ -3971,7 +3993,7 @@
           <a:p>
             <a:pPr algn="ctr"/>
             <a:r>
-              <a:rPr lang="fr-FR" dirty="0">
+              <a:rPr lang="fr-FR" u="sng" dirty="0">
                 <a:solidFill>
                   <a:schemeClr val="tx2">
                     <a:lumMod val="60000"/>
@@ -3985,7 +4007,7 @@
           <a:p>
             <a:pPr algn="ctr"/>
             <a:r>
-              <a:rPr lang="fr-FR" dirty="0" err="1">
+              <a:rPr lang="fr-FR" u="sng" dirty="0" err="1">
                 <a:solidFill>
                   <a:schemeClr val="tx2">
                     <a:lumMod val="60000"/>
@@ -3995,7 +4017,7 @@
               </a:rPr>
               <a:t>languages</a:t>
             </a:r>
-            <a:endParaRPr lang="fr-FR" dirty="0">
+            <a:endParaRPr lang="fr-FR" u="sng" dirty="0">
               <a:solidFill>
                 <a:schemeClr val="tx2">
                   <a:lumMod val="60000"/>
@@ -4037,7 +4059,7 @@
           </a:prstGeom>
           <a:noFill/>
           <a:extLst>
-            <a:ext uri="{909E8E84-426E-40dd-AFC4-6F175D3DCCD1}">
+            <a:ext uri="{909E8E84-426E-40DD-AFC4-6F175D3DCCD1}">
               <a14:hiddenFill xmlns:a14="http://schemas.microsoft.com/office/drawing/2010/main">
                 <a:solidFill>
                   <a:srgbClr val="FFFFFF"/>
@@ -4095,7 +4117,7 @@
               <a:noFill/>
             </a:ln>
             <a:extLst>
-              <a:ext uri="{909E8E84-426E-40dd-AFC4-6F175D3DCCD1}">
+              <a:ext uri="{909E8E84-426E-40DD-AFC4-6F175D3DCCD1}">
                 <a14:hiddenFill xmlns:a14="http://schemas.microsoft.com/office/drawing/2010/main">
                   <a:solidFill>
                     <a:srgbClr val="FFFFFF"/>
@@ -4213,18 +4235,34 @@
             </a:lstStyle>
             <a:p>
               <a:r>
-                <a:rPr lang="fr-FR" dirty="0" err="1"/>
+                <a:rPr lang="fr-FR" dirty="0" err="1">
+                  <a:solidFill>
+                    <a:schemeClr val="tx1"/>
+                  </a:solidFill>
+                </a:rPr>
                 <a:t>Language</a:t>
               </a:r>
               <a:r>
-                <a:rPr lang="fr-FR" dirty="0"/>
+                <a:rPr lang="fr-FR" dirty="0">
+                  <a:solidFill>
+                    <a:schemeClr val="tx1"/>
+                  </a:solidFill>
+                </a:rPr>
                 <a:t> </a:t>
               </a:r>
               <a:r>
-                <a:rPr lang="fr-FR" dirty="0" err="1"/>
+                <a:rPr lang="fr-FR" dirty="0" err="1">
+                  <a:solidFill>
+                    <a:schemeClr val="tx1"/>
+                  </a:solidFill>
+                </a:rPr>
                 <a:t>Workbench</a:t>
               </a:r>
-              <a:endParaRPr lang="fr-FR" dirty="0"/>
+              <a:endParaRPr lang="fr-FR" dirty="0">
+                <a:solidFill>
+                  <a:schemeClr val="tx1"/>
+                </a:solidFill>
+              </a:endParaRPr>
             </a:p>
           </p:txBody>
         </p:sp>
@@ -4337,17 +4375,33 @@
           </a:lstStyle>
           <a:p>
             <a:r>
-              <a:rPr lang="fr-FR" dirty="0" err="1"/>
+              <a:rPr lang="fr-FR" dirty="0" err="1">
+                <a:solidFill>
+                  <a:schemeClr val="tx1"/>
+                </a:solidFill>
+              </a:rPr>
               <a:t>Modeling</a:t>
             </a:r>
-            <a:endParaRPr lang="fr-FR" dirty="0"/>
-          </a:p>
-          <a:p>
-            <a:r>
-              <a:rPr lang="fr-FR" dirty="0" err="1"/>
+            <a:endParaRPr lang="fr-FR" dirty="0">
+              <a:solidFill>
+                <a:schemeClr val="tx1"/>
+              </a:solidFill>
+            </a:endParaRPr>
+          </a:p>
+          <a:p>
+            <a:r>
+              <a:rPr lang="fr-FR" dirty="0" err="1">
+                <a:solidFill>
+                  <a:schemeClr val="tx1"/>
+                </a:solidFill>
+              </a:rPr>
               <a:t>Workbench</a:t>
             </a:r>
-            <a:endParaRPr lang="fr-FR" dirty="0"/>
+            <a:endParaRPr lang="fr-FR" dirty="0">
+              <a:solidFill>
+                <a:schemeClr val="tx1"/>
+              </a:solidFill>
+            </a:endParaRPr>
           </a:p>
         </p:txBody>
       </p:sp>
@@ -4393,7 +4447,7 @@
           <a:p>
             <a:pPr algn="ctr"/>
             <a:r>
-              <a:rPr lang="fr-FR" dirty="0" err="1" smtClean="0">
+              <a:rPr lang="fr-FR" u="sng" dirty="0" err="1" smtClean="0">
                 <a:solidFill>
                   <a:schemeClr val="tx2">
                     <a:lumMod val="60000"/>
@@ -4403,7 +4457,7 @@
               </a:rPr>
               <a:t>Coordinate</a:t>
             </a:r>
-            <a:endParaRPr lang="fr-FR" dirty="0">
+            <a:endParaRPr lang="fr-FR" u="sng" dirty="0">
               <a:solidFill>
                 <a:schemeClr val="tx2">
                   <a:lumMod val="60000"/>
@@ -4415,7 +4469,7 @@
           <a:p>
             <a:pPr algn="ctr"/>
             <a:r>
-              <a:rPr lang="fr-FR" dirty="0" err="1" smtClean="0">
+              <a:rPr lang="fr-FR" u="sng" dirty="0" err="1" smtClean="0">
                 <a:solidFill>
                   <a:schemeClr val="tx2">
                     <a:lumMod val="60000"/>
@@ -4425,7 +4479,7 @@
               </a:rPr>
               <a:t>models</a:t>
             </a:r>
-            <a:endParaRPr lang="fr-FR" dirty="0">
+            <a:endParaRPr lang="fr-FR" u="sng" dirty="0">
               <a:solidFill>
                 <a:schemeClr val="tx2">
                   <a:lumMod val="60000"/>
@@ -4449,7 +4503,7 @@
   <p:timing>
     <p:tnLst>
       <p:par>
-        <p:cTn xmlns:p14="http://schemas.microsoft.com/office/powerpoint/2010/main" id="1" dur="indefinite" restart="never" nodeType="tmRoot"/>
+        <p:cTn id="1" dur="indefinite" restart="never" nodeType="tmRoot"/>
       </p:par>
     </p:tnLst>
   </p:timing>

</xml_diff>